<commit_message>
updated develop to presentation
</commit_message>
<xml_diff>
--- a/assets/Presentation/Group-1-Presentation-Slides.pptx
+++ b/assets/Presentation/Group-1-Presentation-Slides.pptx
@@ -247,6 +247,11 @@
       </a:defRPr>
     </a:lvl9pPr>
   </p:defaultTextStyle>
+  <p:extLst>
+    <p:ext uri="{EFAFB233-063F-42B5-8137-9DF3F51BA10A}">
+      <p15:sldGuideLst xmlns:p15="http://schemas.microsoft.com/office/powerpoint/2012/main"/>
+    </p:ext>
+  </p:extLst>
 </p:presentation>
 </file>
 
@@ -1240,7 +1245,7 @@
         </p:nvSpPr>
         <p:spPr>
           <a:xfrm>
-            <a:off x="381300" y="685800"/>
+            <a:off x="381000" y="685800"/>
             <a:ext cx="6096000" cy="3429000"/>
           </a:xfrm>
           <a:custGeom>
@@ -6959,6 +6964,120 @@
               </a:spcAft>
               <a:buNone/>
             </a:pPr>
+            <a:r>
+              <a:rPr lang="en-US" dirty="0"/>
+              <a:t>Embed google maps of area</a:t>
+            </a:r>
+          </a:p>
+          <a:p>
+            <a:pPr marL="0" lvl="0" indent="0" algn="l" rtl="0">
+              <a:spcBef>
+                <a:spcPts val="0"/>
+              </a:spcBef>
+              <a:spcAft>
+                <a:spcPts val="1600"/>
+              </a:spcAft>
+              <a:buNone/>
+            </a:pPr>
+            <a:r>
+              <a:rPr lang="en-US" dirty="0"/>
+              <a:t>-incorporate separate paid </a:t>
+            </a:r>
+            <a:r>
+              <a:rPr lang="en-US" dirty="0" err="1"/>
+              <a:t>api</a:t>
+            </a:r>
+            <a:r>
+              <a:rPr lang="en-US" dirty="0"/>
+              <a:t> to pull map data </a:t>
+            </a:r>
+          </a:p>
+          <a:p>
+            <a:pPr marL="0" lvl="0" indent="0" algn="l" rtl="0">
+              <a:spcBef>
+                <a:spcPts val="0"/>
+              </a:spcBef>
+              <a:spcAft>
+                <a:spcPts val="1600"/>
+              </a:spcAft>
+              <a:buNone/>
+            </a:pPr>
+            <a:r>
+              <a:rPr lang="en-US" dirty="0"/>
+              <a:t>Adding saved favorite trail name list</a:t>
+            </a:r>
+          </a:p>
+          <a:p>
+            <a:pPr marL="0" lvl="0" indent="0" algn="l" rtl="0">
+              <a:spcBef>
+                <a:spcPts val="0"/>
+              </a:spcBef>
+              <a:spcAft>
+                <a:spcPts val="1600"/>
+              </a:spcAft>
+              <a:buNone/>
+            </a:pPr>
+            <a:r>
+              <a:rPr lang="en-US" dirty="0"/>
+              <a:t>Array of </a:t>
+            </a:r>
+            <a:r>
+              <a:rPr lang="en-US" dirty="0" err="1"/>
+              <a:t>urls</a:t>
+            </a:r>
+            <a:r>
+              <a:rPr lang="en-US" dirty="0"/>
+              <a:t>, save button finds </a:t>
+            </a:r>
+            <a:r>
+              <a:rPr lang="en-US" dirty="0" err="1"/>
+              <a:t>url</a:t>
+            </a:r>
+            <a:r>
+              <a:rPr lang="en-US" dirty="0"/>
+              <a:t> in a list </a:t>
+            </a:r>
+          </a:p>
+          <a:p>
+            <a:pPr marL="0" lvl="0" indent="0" algn="l" rtl="0">
+              <a:spcBef>
+                <a:spcPts val="0"/>
+              </a:spcBef>
+              <a:spcAft>
+                <a:spcPts val="1600"/>
+              </a:spcAft>
+              <a:buNone/>
+            </a:pPr>
+            <a:r>
+              <a:rPr lang="en-US" dirty="0"/>
+              <a:t>Fire safety</a:t>
+            </a:r>
+          </a:p>
+          <a:p>
+            <a:pPr marL="0" lvl="0" indent="0" algn="l" rtl="0">
+              <a:spcBef>
+                <a:spcPts val="0"/>
+              </a:spcBef>
+              <a:spcAft>
+                <a:spcPts val="1600"/>
+              </a:spcAft>
+              <a:buNone/>
+            </a:pPr>
+            <a:r>
+              <a:rPr lang="en-US" dirty="0"/>
+              <a:t>Pollen levels</a:t>
+            </a:r>
+          </a:p>
+          <a:p>
+            <a:pPr marL="0" lvl="0" indent="0" algn="l" rtl="0">
+              <a:spcBef>
+                <a:spcPts val="0"/>
+              </a:spcBef>
+              <a:spcAft>
+                <a:spcPts val="1600"/>
+              </a:spcAft>
+              <a:buNone/>
+            </a:pPr>
             <a:endParaRPr dirty="0"/>
           </a:p>
         </p:txBody>

</xml_diff>